<commit_message>
fluorescence spectra working - debugging rtTrackSNR.m offline
</commit_message>
<xml_diff>
--- a/code/TIRFcalibration/docs/interface.pptx
+++ b/code/TIRFcalibration/docs/interface.pptx
@@ -203,7 +203,7 @@
           <a:p>
             <a:fld id="{430A3F5B-262C-4C2F-A540-9B43A6623F5E}" type="datetimeFigureOut">
               <a:rPr lang="en-US" smtClean="0"/>
-              <a:t>12/17/2017</a:t>
+              <a:t>12/26/2017</a:t>
             </a:fld>
             <a:endParaRPr lang="en-US"/>
           </a:p>
@@ -686,7 +686,7 @@
           <a:p>
             <a:fld id="{68C3AE15-7363-4FAE-9235-9F3D7C1430E2}" type="datetimeFigureOut">
               <a:rPr lang="en-US" smtClean="0"/>
-              <a:t>12/14/2017</a:t>
+              <a:t>12/26/2017</a:t>
             </a:fld>
             <a:endParaRPr lang="en-US"/>
           </a:p>
@@ -856,7 +856,7 @@
           <a:p>
             <a:fld id="{68C3AE15-7363-4FAE-9235-9F3D7C1430E2}" type="datetimeFigureOut">
               <a:rPr lang="en-US" smtClean="0"/>
-              <a:t>12/14/2017</a:t>
+              <a:t>12/26/2017</a:t>
             </a:fld>
             <a:endParaRPr lang="en-US"/>
           </a:p>
@@ -1036,7 +1036,7 @@
           <a:p>
             <a:fld id="{68C3AE15-7363-4FAE-9235-9F3D7C1430E2}" type="datetimeFigureOut">
               <a:rPr lang="en-US" smtClean="0"/>
-              <a:t>12/14/2017</a:t>
+              <a:t>12/26/2017</a:t>
             </a:fld>
             <a:endParaRPr lang="en-US"/>
           </a:p>
@@ -1206,7 +1206,7 @@
           <a:p>
             <a:fld id="{68C3AE15-7363-4FAE-9235-9F3D7C1430E2}" type="datetimeFigureOut">
               <a:rPr lang="en-US" smtClean="0"/>
-              <a:t>12/14/2017</a:t>
+              <a:t>12/26/2017</a:t>
             </a:fld>
             <a:endParaRPr lang="en-US"/>
           </a:p>
@@ -1452,7 +1452,7 @@
           <a:p>
             <a:fld id="{68C3AE15-7363-4FAE-9235-9F3D7C1430E2}" type="datetimeFigureOut">
               <a:rPr lang="en-US" smtClean="0"/>
-              <a:t>12/14/2017</a:t>
+              <a:t>12/26/2017</a:t>
             </a:fld>
             <a:endParaRPr lang="en-US"/>
           </a:p>
@@ -1684,7 +1684,7 @@
           <a:p>
             <a:fld id="{68C3AE15-7363-4FAE-9235-9F3D7C1430E2}" type="datetimeFigureOut">
               <a:rPr lang="en-US" smtClean="0"/>
-              <a:t>12/14/2017</a:t>
+              <a:t>12/26/2017</a:t>
             </a:fld>
             <a:endParaRPr lang="en-US"/>
           </a:p>
@@ -2051,7 +2051,7 @@
           <a:p>
             <a:fld id="{68C3AE15-7363-4FAE-9235-9F3D7C1430E2}" type="datetimeFigureOut">
               <a:rPr lang="en-US" smtClean="0"/>
-              <a:t>12/14/2017</a:t>
+              <a:t>12/26/2017</a:t>
             </a:fld>
             <a:endParaRPr lang="en-US"/>
           </a:p>
@@ -2169,7 +2169,7 @@
           <a:p>
             <a:fld id="{68C3AE15-7363-4FAE-9235-9F3D7C1430E2}" type="datetimeFigureOut">
               <a:rPr lang="en-US" smtClean="0"/>
-              <a:t>12/14/2017</a:t>
+              <a:t>12/26/2017</a:t>
             </a:fld>
             <a:endParaRPr lang="en-US"/>
           </a:p>
@@ -2264,7 +2264,7 @@
           <a:p>
             <a:fld id="{68C3AE15-7363-4FAE-9235-9F3D7C1430E2}" type="datetimeFigureOut">
               <a:rPr lang="en-US" smtClean="0"/>
-              <a:t>12/14/2017</a:t>
+              <a:t>12/26/2017</a:t>
             </a:fld>
             <a:endParaRPr lang="en-US"/>
           </a:p>
@@ -2541,7 +2541,7 @@
           <a:p>
             <a:fld id="{68C3AE15-7363-4FAE-9235-9F3D7C1430E2}" type="datetimeFigureOut">
               <a:rPr lang="en-US" smtClean="0"/>
-              <a:t>12/14/2017</a:t>
+              <a:t>12/26/2017</a:t>
             </a:fld>
             <a:endParaRPr lang="en-US"/>
           </a:p>
@@ -2794,7 +2794,7 @@
           <a:p>
             <a:fld id="{68C3AE15-7363-4FAE-9235-9F3D7C1430E2}" type="datetimeFigureOut">
               <a:rPr lang="en-US" smtClean="0"/>
-              <a:t>12/14/2017</a:t>
+              <a:t>12/26/2017</a:t>
             </a:fld>
             <a:endParaRPr lang="en-US"/>
           </a:p>
@@ -3007,7 +3007,7 @@
           <a:p>
             <a:fld id="{68C3AE15-7363-4FAE-9235-9F3D7C1430E2}" type="datetimeFigureOut">
               <a:rPr lang="en-US" smtClean="0"/>
-              <a:t>12/14/2017</a:t>
+              <a:t>12/26/2017</a:t>
             </a:fld>
             <a:endParaRPr lang="en-US"/>
           </a:p>
@@ -12977,7 +12977,7 @@
         </p:nvGrpSpPr>
         <p:grpSpPr>
           <a:xfrm>
-            <a:off x="439291" y="3070197"/>
+            <a:off x="-97039" y="3070197"/>
             <a:ext cx="1667444" cy="1512015"/>
             <a:chOff x="439291" y="3070197"/>
             <a:chExt cx="1667444" cy="1512015"/>
@@ -13083,7 +13083,7 @@
         </p:nvSpPr>
         <p:spPr>
           <a:xfrm>
-            <a:off x="2038635" y="3581221"/>
+            <a:off x="1502305" y="3581221"/>
             <a:ext cx="1011815" cy="369332"/>
           </a:xfrm>
           <a:prstGeom prst="rect">
@@ -13129,7 +13129,7 @@
         </p:nvSpPr>
         <p:spPr>
           <a:xfrm>
-            <a:off x="5320501" y="347242"/>
+            <a:off x="4784171" y="347242"/>
             <a:ext cx="873957" cy="369332"/>
           </a:xfrm>
           <a:prstGeom prst="rect">
@@ -13168,7 +13168,7 @@
         </p:nvSpPr>
         <p:spPr>
           <a:xfrm>
-            <a:off x="3147431" y="1442474"/>
+            <a:off x="2611101" y="1442474"/>
             <a:ext cx="1728165" cy="369332"/>
           </a:xfrm>
           <a:prstGeom prst="rect">
@@ -13202,7 +13202,7 @@
         </p:nvSpPr>
         <p:spPr>
           <a:xfrm>
-            <a:off x="5114117" y="4253268"/>
+            <a:off x="4577787" y="4253268"/>
             <a:ext cx="2772875" cy="369332"/>
           </a:xfrm>
           <a:prstGeom prst="rect">
@@ -13231,7 +13231,7 @@
         </p:nvSpPr>
         <p:spPr>
           <a:xfrm>
-            <a:off x="2038635" y="4622600"/>
+            <a:off x="1502305" y="4622600"/>
             <a:ext cx="1287532" cy="369332"/>
           </a:xfrm>
           <a:prstGeom prst="rect">
@@ -13273,7 +13273,7 @@
         </p:nvGrpSpPr>
         <p:grpSpPr>
           <a:xfrm>
-            <a:off x="4967654" y="716575"/>
+            <a:off x="4431324" y="716575"/>
             <a:ext cx="2177959" cy="2061796"/>
             <a:chOff x="3719146" y="558313"/>
             <a:chExt cx="2177959" cy="2061796"/>
@@ -13479,7 +13479,7 @@
         </p:nvGrpSpPr>
         <p:grpSpPr>
           <a:xfrm>
-            <a:off x="1381248" y="662712"/>
+            <a:off x="844918" y="662712"/>
             <a:ext cx="1654299" cy="2061796"/>
             <a:chOff x="132740" y="504450"/>
             <a:chExt cx="1654299" cy="2061796"/>
@@ -13663,7 +13663,7 @@
         </p:nvCxnSpPr>
         <p:spPr>
           <a:xfrm flipV="1">
-            <a:off x="3005251" y="1913999"/>
+            <a:off x="2468921" y="1913999"/>
             <a:ext cx="801819" cy="1667222"/>
           </a:xfrm>
           <a:prstGeom prst="straightConnector1">
@@ -13696,7 +13696,7 @@
         </p:nvCxnSpPr>
         <p:spPr>
           <a:xfrm>
-            <a:off x="5913577" y="2849787"/>
+            <a:off x="5377247" y="2849787"/>
             <a:ext cx="92301" cy="1273806"/>
           </a:xfrm>
           <a:prstGeom prst="straightConnector1">
@@ -13729,7 +13729,7 @@
         </p:nvCxnSpPr>
         <p:spPr>
           <a:xfrm flipH="1">
-            <a:off x="3406160" y="4620391"/>
+            <a:off x="2869830" y="4620391"/>
             <a:ext cx="1789624" cy="131313"/>
           </a:xfrm>
           <a:prstGeom prst="straightConnector1">
@@ -13762,7 +13762,7 @@
         </p:nvCxnSpPr>
         <p:spPr>
           <a:xfrm flipV="1">
-            <a:off x="2635886" y="3990940"/>
+            <a:off x="2099556" y="3990940"/>
             <a:ext cx="1" cy="591272"/>
           </a:xfrm>
           <a:prstGeom prst="straightConnector1">
@@ -13795,7 +13795,7 @@
         </p:nvSpPr>
         <p:spPr>
           <a:xfrm>
-            <a:off x="3262917" y="3545704"/>
+            <a:off x="2726587" y="3545704"/>
             <a:ext cx="1011815" cy="369332"/>
           </a:xfrm>
           <a:prstGeom prst="rect">
@@ -13841,7 +13841,7 @@
         </p:nvCxnSpPr>
         <p:spPr>
           <a:xfrm flipH="1" flipV="1">
-            <a:off x="4343844" y="3955424"/>
+            <a:off x="3807514" y="3955424"/>
             <a:ext cx="708697" cy="378453"/>
           </a:xfrm>
           <a:prstGeom prst="straightConnector1">
@@ -13866,30 +13866,320 @@
           </a:fontRef>
         </p:style>
       </p:cxnSp>
+      <p:cxnSp>
+        <p:nvCxnSpPr>
+          <p:cNvPr id="51" name="Straight Arrow Connector 50"/>
+          <p:cNvCxnSpPr/>
+          <p:nvPr/>
+        </p:nvCxnSpPr>
+        <p:spPr>
+          <a:xfrm>
+            <a:off x="2370879" y="1680797"/>
+            <a:ext cx="256676" cy="0"/>
+          </a:xfrm>
+          <a:prstGeom prst="straightConnector1">
+            <a:avLst/>
+          </a:prstGeom>
+          <a:ln>
+            <a:tailEnd type="triangle"/>
+          </a:ln>
+        </p:spPr>
+        <p:style>
+          <a:lnRef idx="1">
+            <a:schemeClr val="accent1"/>
+          </a:lnRef>
+          <a:fillRef idx="0">
+            <a:schemeClr val="accent1"/>
+          </a:fillRef>
+          <a:effectRef idx="0">
+            <a:schemeClr val="accent1"/>
+          </a:effectRef>
+          <a:fontRef idx="minor">
+            <a:schemeClr val="tx1"/>
+          </a:fontRef>
+        </p:style>
+      </p:cxnSp>
+      <p:cxnSp>
+        <p:nvCxnSpPr>
+          <p:cNvPr id="53" name="Straight Arrow Connector 52"/>
+          <p:cNvCxnSpPr/>
+          <p:nvPr/>
+        </p:nvCxnSpPr>
+        <p:spPr>
+          <a:xfrm>
+            <a:off x="4302986" y="1627140"/>
+            <a:ext cx="256676" cy="0"/>
+          </a:xfrm>
+          <a:prstGeom prst="straightConnector1">
+            <a:avLst/>
+          </a:prstGeom>
+          <a:ln>
+            <a:tailEnd type="triangle"/>
+          </a:ln>
+        </p:spPr>
+        <p:style>
+          <a:lnRef idx="1">
+            <a:schemeClr val="accent1"/>
+          </a:lnRef>
+          <a:fillRef idx="0">
+            <a:schemeClr val="accent1"/>
+          </a:fillRef>
+          <a:effectRef idx="0">
+            <a:schemeClr val="accent1"/>
+          </a:effectRef>
+          <a:fontRef idx="minor">
+            <a:schemeClr val="tx1"/>
+          </a:fontRef>
+        </p:style>
+      </p:cxnSp>
+      <p:cxnSp>
+        <p:nvCxnSpPr>
+          <p:cNvPr id="54" name="Straight Arrow Connector 53"/>
+          <p:cNvCxnSpPr/>
+          <p:nvPr/>
+        </p:nvCxnSpPr>
+        <p:spPr>
+          <a:xfrm flipH="1" flipV="1">
+            <a:off x="1876355" y="2778371"/>
+            <a:ext cx="143308" cy="704967"/>
+          </a:xfrm>
+          <a:prstGeom prst="straightConnector1">
+            <a:avLst/>
+          </a:prstGeom>
+          <a:ln>
+            <a:tailEnd type="triangle"/>
+          </a:ln>
+        </p:spPr>
+        <p:style>
+          <a:lnRef idx="1">
+            <a:schemeClr val="accent1"/>
+          </a:lnRef>
+          <a:fillRef idx="0">
+            <a:schemeClr val="accent1"/>
+          </a:fillRef>
+          <a:effectRef idx="0">
+            <a:schemeClr val="accent1"/>
+          </a:effectRef>
+          <a:fontRef idx="minor">
+            <a:schemeClr val="tx1"/>
+          </a:fontRef>
+        </p:style>
+      </p:cxnSp>
+      <p:cxnSp>
+        <p:nvCxnSpPr>
+          <p:cNvPr id="34" name="Straight Arrow Connector 33"/>
+          <p:cNvCxnSpPr/>
+          <p:nvPr/>
+        </p:nvCxnSpPr>
+        <p:spPr>
+          <a:xfrm flipH="1" flipV="1">
+            <a:off x="2370879" y="3990111"/>
+            <a:ext cx="2167749" cy="498967"/>
+          </a:xfrm>
+          <a:prstGeom prst="straightConnector1">
+            <a:avLst/>
+          </a:prstGeom>
+          <a:ln>
+            <a:tailEnd type="triangle"/>
+          </a:ln>
+        </p:spPr>
+        <p:style>
+          <a:lnRef idx="1">
+            <a:schemeClr val="accent1"/>
+          </a:lnRef>
+          <a:fillRef idx="0">
+            <a:schemeClr val="accent1"/>
+          </a:fillRef>
+          <a:effectRef idx="0">
+            <a:schemeClr val="accent1"/>
+          </a:effectRef>
+          <a:fontRef idx="minor">
+            <a:schemeClr val="tx1"/>
+          </a:fontRef>
+        </p:style>
+      </p:cxnSp>
+      <p:cxnSp>
+        <p:nvCxnSpPr>
+          <p:cNvPr id="38" name="Straight Arrow Connector 37"/>
+          <p:cNvCxnSpPr/>
+          <p:nvPr/>
+        </p:nvCxnSpPr>
+        <p:spPr>
+          <a:xfrm flipV="1">
+            <a:off x="6594050" y="2368268"/>
+            <a:ext cx="400391" cy="1903151"/>
+          </a:xfrm>
+          <a:prstGeom prst="straightConnector1">
+            <a:avLst/>
+          </a:prstGeom>
+          <a:ln>
+            <a:tailEnd type="triangle"/>
+          </a:ln>
+        </p:spPr>
+        <p:style>
+          <a:lnRef idx="1">
+            <a:schemeClr val="accent1"/>
+          </a:lnRef>
+          <a:fillRef idx="0">
+            <a:schemeClr val="accent1"/>
+          </a:fillRef>
+          <a:effectRef idx="0">
+            <a:schemeClr val="accent1"/>
+          </a:effectRef>
+          <a:fontRef idx="minor">
+            <a:schemeClr val="tx1"/>
+          </a:fontRef>
+        </p:style>
+      </p:cxnSp>
       <p:grpSp>
         <p:nvGrpSpPr>
-          <p:cNvPr id="43" name="Group 42"/>
+          <p:cNvPr id="5" name="Group 4"/>
           <p:cNvGrpSpPr/>
           <p:nvPr/>
         </p:nvGrpSpPr>
         <p:grpSpPr>
           <a:xfrm>
-            <a:off x="7445204" y="1147308"/>
-            <a:ext cx="1928733" cy="1754326"/>
-            <a:chOff x="6196696" y="989046"/>
-            <a:chExt cx="1928733" cy="1754326"/>
+            <a:off x="6491769" y="300460"/>
+            <a:ext cx="1928733" cy="2040070"/>
+            <a:chOff x="6908874" y="861564"/>
+            <a:chExt cx="1928733" cy="2040070"/>
           </a:xfrm>
         </p:grpSpPr>
+        <p:grpSp>
+          <p:nvGrpSpPr>
+            <p:cNvPr id="43" name="Group 42"/>
+            <p:cNvGrpSpPr/>
+            <p:nvPr/>
+          </p:nvGrpSpPr>
+          <p:grpSpPr>
+            <a:xfrm>
+              <a:off x="6908874" y="1147308"/>
+              <a:ext cx="1928733" cy="1754326"/>
+              <a:chOff x="6196696" y="989046"/>
+              <a:chExt cx="1928733" cy="1754326"/>
+            </a:xfrm>
+          </p:grpSpPr>
+          <p:sp>
+            <p:nvSpPr>
+              <p:cNvPr id="42" name="Rectangle 41"/>
+              <p:cNvSpPr/>
+              <p:nvPr/>
+            </p:nvSpPr>
+            <p:spPr>
+              <a:xfrm>
+                <a:off x="6196696" y="1016784"/>
+                <a:ext cx="1928733" cy="1477328"/>
+              </a:xfrm>
+              <a:prstGeom prst="rect">
+                <a:avLst/>
+              </a:prstGeom>
+            </p:spPr>
+            <p:txBody>
+              <a:bodyPr wrap="none">
+                <a:spAutoFit/>
+              </a:bodyPr>
+              <a:lstStyle/>
+              <a:p>
+                <a:r>
+                  <a:rPr lang="en-US" sz="9000" dirty="0" smtClean="0"/>
+                  <a:t>(    )</a:t>
+                </a:r>
+                <a:endParaRPr lang="en-US" sz="9000" dirty="0"/>
+              </a:p>
+            </p:txBody>
+          </p:sp>
+          <p:sp>
+            <p:nvSpPr>
+              <p:cNvPr id="41" name="Rectangle 40"/>
+              <p:cNvSpPr/>
+              <p:nvPr/>
+            </p:nvSpPr>
+            <p:spPr>
+              <a:xfrm>
+                <a:off x="6546683" y="989046"/>
+                <a:ext cx="1323439" cy="1754326"/>
+              </a:xfrm>
+              <a:prstGeom prst="rect">
+                <a:avLst/>
+              </a:prstGeom>
+            </p:spPr>
+            <p:txBody>
+              <a:bodyPr wrap="none">
+                <a:spAutoFit/>
+              </a:bodyPr>
+              <a:lstStyle/>
+              <a:p>
+                <a:r>
+                  <a:rPr lang="en-US" dirty="0" err="1" smtClean="0"/>
+                  <a:t>lmpState</a:t>
+                </a:r>
+                <a:endParaRPr lang="en-US" dirty="0" smtClean="0"/>
+              </a:p>
+              <a:p>
+                <a:r>
+                  <a:rPr lang="en-US" dirty="0" smtClean="0"/>
+                  <a:t>-1: stop</a:t>
+                </a:r>
+              </a:p>
+              <a:p>
+                <a:r>
+                  <a:rPr lang="en-US" dirty="0" smtClean="0"/>
+                  <a:t>-</a:t>
+                </a:r>
+                <a:r>
+                  <a:rPr lang="en-US" dirty="0" err="1" smtClean="0"/>
+                  <a:t>i</a:t>
+                </a:r>
+                <a:r>
+                  <a:rPr lang="en-US" dirty="0" smtClean="0"/>
+                  <a:t>: </a:t>
+                </a:r>
+                <a:r>
+                  <a:rPr lang="en-US" dirty="0" err="1" smtClean="0"/>
+                  <a:t>syncWait</a:t>
+                </a:r>
+                <a:r>
+                  <a:rPr lang="en-US" dirty="0" smtClean="0"/>
+                  <a:t> </a:t>
+                </a:r>
+              </a:p>
+              <a:p>
+                <a:r>
+                  <a:rPr lang="en-US" dirty="0" smtClean="0"/>
+                  <a:t>0:timeout </a:t>
+                </a:r>
+              </a:p>
+              <a:p>
+                <a:r>
+                  <a:rPr lang="en-US" dirty="0" smtClean="0"/>
+                  <a:t>i: </a:t>
+                </a:r>
+                <a:r>
+                  <a:rPr lang="en-US" dirty="0" err="1" smtClean="0"/>
+                  <a:t>syncHere</a:t>
+                </a:r>
+                <a:endParaRPr lang="en-US" dirty="0" smtClean="0"/>
+              </a:p>
+              <a:p>
+                <a:r>
+                  <a:rPr lang="en-US" dirty="0" smtClean="0"/>
+                  <a:t>1:active</a:t>
+                </a:r>
+                <a:endParaRPr lang="en-US" dirty="0"/>
+              </a:p>
+            </p:txBody>
+          </p:sp>
+        </p:grpSp>
         <p:sp>
           <p:nvSpPr>
-            <p:cNvPr id="42" name="Rectangle 41"/>
+            <p:cNvPr id="39" name="Rectangle 38"/>
             <p:cNvSpPr/>
             <p:nvPr/>
           </p:nvSpPr>
           <p:spPr>
             <a:xfrm>
-              <a:off x="6196696" y="1016784"/>
-              <a:ext cx="1928733" cy="1477328"/>
+              <a:off x="7258861" y="861564"/>
+              <a:ext cx="873957" cy="369332"/>
             </a:xfrm>
             <a:prstGeom prst="rect">
               <a:avLst/>
@@ -13902,299 +14192,24 @@
             <a:lstStyle/>
             <a:p>
               <a:r>
-                <a:rPr lang="en-US" sz="9000" dirty="0" smtClean="0"/>
-                <a:t>(    )</a:t>
+                <a:rPr lang="en-US" i="1" dirty="0" err="1" smtClean="0">
+                  <a:solidFill>
+                    <a:srgbClr val="000000"/>
+                  </a:solidFill>
+                  <a:latin typeface="Courier New" panose="02070309020205020404" pitchFamily="49" charset="0"/>
+                </a:rPr>
+                <a:t>matFN</a:t>
               </a:r>
-              <a:endParaRPr lang="en-US" sz="9000" dirty="0"/>
-            </a:p>
-          </p:txBody>
-        </p:sp>
-        <p:sp>
-          <p:nvSpPr>
-            <p:cNvPr id="41" name="Rectangle 40"/>
-            <p:cNvSpPr/>
-            <p:nvPr/>
-          </p:nvSpPr>
-          <p:spPr>
-            <a:xfrm>
-              <a:off x="6546683" y="989046"/>
-              <a:ext cx="1323439" cy="1754326"/>
-            </a:xfrm>
-            <a:prstGeom prst="rect">
-              <a:avLst/>
-            </a:prstGeom>
-          </p:spPr>
-          <p:txBody>
-            <a:bodyPr wrap="none">
-              <a:spAutoFit/>
-            </a:bodyPr>
-            <a:lstStyle/>
-            <a:p>
-              <a:r>
-                <a:rPr lang="en-US" dirty="0" err="1" smtClean="0"/>
-                <a:t>lmpState</a:t>
-              </a:r>
-              <a:endParaRPr lang="en-US" dirty="0" smtClean="0"/>
-            </a:p>
-            <a:p>
-              <a:r>
-                <a:rPr lang="en-US" dirty="0" smtClean="0"/>
-                <a:t>-1: stop</a:t>
-              </a:r>
-            </a:p>
-            <a:p>
-              <a:r>
-                <a:rPr lang="en-US" dirty="0" smtClean="0"/>
-                <a:t>-</a:t>
-              </a:r>
-              <a:r>
-                <a:rPr lang="en-US" dirty="0" err="1" smtClean="0"/>
-                <a:t>i</a:t>
-              </a:r>
-              <a:r>
-                <a:rPr lang="en-US" dirty="0" smtClean="0"/>
-                <a:t>: </a:t>
-              </a:r>
-              <a:r>
-                <a:rPr lang="en-US" dirty="0" err="1" smtClean="0"/>
-                <a:t>syncWait</a:t>
-              </a:r>
-              <a:r>
-                <a:rPr lang="en-US" dirty="0" smtClean="0"/>
-                <a:t> </a:t>
-              </a:r>
-            </a:p>
-            <a:p>
-              <a:r>
-                <a:rPr lang="en-US" dirty="0" smtClean="0"/>
-                <a:t>0:timeout </a:t>
-              </a:r>
-            </a:p>
-            <a:p>
-              <a:r>
-                <a:rPr lang="en-US" dirty="0" smtClean="0"/>
-                <a:t>i: </a:t>
-              </a:r>
-              <a:r>
-                <a:rPr lang="en-US" dirty="0" err="1" smtClean="0"/>
-                <a:t>syncHere</a:t>
-              </a:r>
-              <a:endParaRPr lang="en-US" dirty="0" smtClean="0"/>
-            </a:p>
-            <a:p>
-              <a:r>
-                <a:rPr lang="en-US" dirty="0" smtClean="0"/>
-                <a:t>1:active</a:t>
-              </a:r>
-              <a:endParaRPr lang="en-US" dirty="0"/>
+              <a:endParaRPr lang="en-US" i="1" dirty="0">
+                <a:solidFill>
+                  <a:srgbClr val="000000"/>
+                </a:solidFill>
+                <a:latin typeface="Courier New" panose="02070309020205020404" pitchFamily="49" charset="0"/>
+              </a:endParaRPr>
             </a:p>
           </p:txBody>
         </p:sp>
       </p:grpSp>
-      <p:cxnSp>
-        <p:nvCxnSpPr>
-          <p:cNvPr id="51" name="Straight Arrow Connector 50"/>
-          <p:cNvCxnSpPr/>
-          <p:nvPr/>
-        </p:nvCxnSpPr>
-        <p:spPr>
-          <a:xfrm>
-            <a:off x="2907209" y="1680797"/>
-            <a:ext cx="256676" cy="0"/>
-          </a:xfrm>
-          <a:prstGeom prst="straightConnector1">
-            <a:avLst/>
-          </a:prstGeom>
-          <a:ln>
-            <a:tailEnd type="triangle"/>
-          </a:ln>
-        </p:spPr>
-        <p:style>
-          <a:lnRef idx="1">
-            <a:schemeClr val="accent1"/>
-          </a:lnRef>
-          <a:fillRef idx="0">
-            <a:schemeClr val="accent1"/>
-          </a:fillRef>
-          <a:effectRef idx="0">
-            <a:schemeClr val="accent1"/>
-          </a:effectRef>
-          <a:fontRef idx="minor">
-            <a:schemeClr val="tx1"/>
-          </a:fontRef>
-        </p:style>
-      </p:cxnSp>
-      <p:cxnSp>
-        <p:nvCxnSpPr>
-          <p:cNvPr id="53" name="Straight Arrow Connector 52"/>
-          <p:cNvCxnSpPr/>
-          <p:nvPr/>
-        </p:nvCxnSpPr>
-        <p:spPr>
-          <a:xfrm>
-            <a:off x="4839316" y="1627140"/>
-            <a:ext cx="256676" cy="0"/>
-          </a:xfrm>
-          <a:prstGeom prst="straightConnector1">
-            <a:avLst/>
-          </a:prstGeom>
-          <a:ln>
-            <a:tailEnd type="triangle"/>
-          </a:ln>
-        </p:spPr>
-        <p:style>
-          <a:lnRef idx="1">
-            <a:schemeClr val="accent1"/>
-          </a:lnRef>
-          <a:fillRef idx="0">
-            <a:schemeClr val="accent1"/>
-          </a:fillRef>
-          <a:effectRef idx="0">
-            <a:schemeClr val="accent1"/>
-          </a:effectRef>
-          <a:fontRef idx="minor">
-            <a:schemeClr val="tx1"/>
-          </a:fontRef>
-        </p:style>
-      </p:cxnSp>
-      <p:cxnSp>
-        <p:nvCxnSpPr>
-          <p:cNvPr id="54" name="Straight Arrow Connector 53"/>
-          <p:cNvCxnSpPr/>
-          <p:nvPr/>
-        </p:nvCxnSpPr>
-        <p:spPr>
-          <a:xfrm flipH="1" flipV="1">
-            <a:off x="2412685" y="2778371"/>
-            <a:ext cx="143308" cy="704967"/>
-          </a:xfrm>
-          <a:prstGeom prst="straightConnector1">
-            <a:avLst/>
-          </a:prstGeom>
-          <a:ln>
-            <a:tailEnd type="triangle"/>
-          </a:ln>
-        </p:spPr>
-        <p:style>
-          <a:lnRef idx="1">
-            <a:schemeClr val="accent1"/>
-          </a:lnRef>
-          <a:fillRef idx="0">
-            <a:schemeClr val="accent1"/>
-          </a:fillRef>
-          <a:effectRef idx="0">
-            <a:schemeClr val="accent1"/>
-          </a:effectRef>
-          <a:fontRef idx="minor">
-            <a:schemeClr val="tx1"/>
-          </a:fontRef>
-        </p:style>
-      </p:cxnSp>
-      <p:cxnSp>
-        <p:nvCxnSpPr>
-          <p:cNvPr id="34" name="Straight Arrow Connector 33"/>
-          <p:cNvCxnSpPr/>
-          <p:nvPr/>
-        </p:nvCxnSpPr>
-        <p:spPr>
-          <a:xfrm flipH="1" flipV="1">
-            <a:off x="2907209" y="3990111"/>
-            <a:ext cx="2167749" cy="498967"/>
-          </a:xfrm>
-          <a:prstGeom prst="straightConnector1">
-            <a:avLst/>
-          </a:prstGeom>
-          <a:ln>
-            <a:tailEnd type="triangle"/>
-          </a:ln>
-        </p:spPr>
-        <p:style>
-          <a:lnRef idx="1">
-            <a:schemeClr val="accent1"/>
-          </a:lnRef>
-          <a:fillRef idx="0">
-            <a:schemeClr val="accent1"/>
-          </a:fillRef>
-          <a:effectRef idx="0">
-            <a:schemeClr val="accent1"/>
-          </a:effectRef>
-          <a:fontRef idx="minor">
-            <a:schemeClr val="tx1"/>
-          </a:fontRef>
-        </p:style>
-      </p:cxnSp>
-      <p:cxnSp>
-        <p:nvCxnSpPr>
-          <p:cNvPr id="38" name="Straight Arrow Connector 37"/>
-          <p:cNvCxnSpPr/>
-          <p:nvPr/>
-        </p:nvCxnSpPr>
-        <p:spPr>
-          <a:xfrm flipV="1">
-            <a:off x="7833850" y="2901634"/>
-            <a:ext cx="351788" cy="1221959"/>
-          </a:xfrm>
-          <a:prstGeom prst="straightConnector1">
-            <a:avLst/>
-          </a:prstGeom>
-          <a:ln>
-            <a:tailEnd type="triangle"/>
-          </a:ln>
-        </p:spPr>
-        <p:style>
-          <a:lnRef idx="1">
-            <a:schemeClr val="accent1"/>
-          </a:lnRef>
-          <a:fillRef idx="0">
-            <a:schemeClr val="accent1"/>
-          </a:fillRef>
-          <a:effectRef idx="0">
-            <a:schemeClr val="accent1"/>
-          </a:effectRef>
-          <a:fontRef idx="minor">
-            <a:schemeClr val="tx1"/>
-          </a:fontRef>
-        </p:style>
-      </p:cxnSp>
-      <p:sp>
-        <p:nvSpPr>
-          <p:cNvPr id="39" name="Rectangle 38"/>
-          <p:cNvSpPr/>
-          <p:nvPr/>
-        </p:nvSpPr>
-        <p:spPr>
-          <a:xfrm>
-            <a:off x="7795191" y="861564"/>
-            <a:ext cx="873957" cy="369332"/>
-          </a:xfrm>
-          <a:prstGeom prst="rect">
-            <a:avLst/>
-          </a:prstGeom>
-        </p:spPr>
-        <p:txBody>
-          <a:bodyPr wrap="none">
-            <a:spAutoFit/>
-          </a:bodyPr>
-          <a:lstStyle/>
-          <a:p>
-            <a:r>
-              <a:rPr lang="en-US" i="1" dirty="0" err="1" smtClean="0">
-                <a:solidFill>
-                  <a:srgbClr val="000000"/>
-                </a:solidFill>
-                <a:latin typeface="Courier New" panose="02070309020205020404" pitchFamily="49" charset="0"/>
-              </a:rPr>
-              <a:t>matFN</a:t>
-            </a:r>
-            <a:endParaRPr lang="en-US" i="1" dirty="0">
-              <a:solidFill>
-                <a:srgbClr val="000000"/>
-              </a:solidFill>
-              <a:latin typeface="Courier New" panose="02070309020205020404" pitchFamily="49" charset="0"/>
-            </a:endParaRPr>
-          </a:p>
-        </p:txBody>
-      </p:sp>
       <p:sp>
         <p:nvSpPr>
           <p:cNvPr id="2" name="Rectangle 1"/>
@@ -14203,7 +14218,7 @@
         </p:nvSpPr>
         <p:spPr>
           <a:xfrm>
-            <a:off x="4770168" y="58459"/>
+            <a:off x="4233838" y="58459"/>
             <a:ext cx="2390398" cy="369332"/>
           </a:xfrm>
           <a:prstGeom prst="rect">
@@ -14225,6 +14240,448 @@
               </a:rPr>
               <a:t>worker MAT files</a:t>
             </a:r>
+          </a:p>
+        </p:txBody>
+      </p:sp>
+      <p:sp>
+        <p:nvSpPr>
+          <p:cNvPr id="3" name="Rectangle 2"/>
+          <p:cNvSpPr/>
+          <p:nvPr/>
+        </p:nvSpPr>
+        <p:spPr>
+          <a:xfrm>
+            <a:off x="7431865" y="2340530"/>
+            <a:ext cx="4030206" cy="2308324"/>
+          </a:xfrm>
+          <a:prstGeom prst="rect">
+            <a:avLst/>
+          </a:prstGeom>
+        </p:spPr>
+        <p:txBody>
+          <a:bodyPr wrap="none">
+            <a:spAutoFit/>
+          </a:bodyPr>
+          <a:lstStyle/>
+          <a:p>
+            <a:r>
+              <a:rPr lang="en-US" sz="1200" dirty="0" err="1" smtClean="0"/>
+              <a:t>funcFeedback.m</a:t>
+            </a:r>
+            <a:r>
+              <a:rPr lang="en-US" sz="1200" dirty="0" smtClean="0"/>
+              <a:t> (runs in each worker)</a:t>
+            </a:r>
+          </a:p>
+          <a:p>
+            <a:pPr marL="171450" indent="-171450">
+              <a:buFontTx/>
+              <a:buChar char="-"/>
+            </a:pPr>
+            <a:r>
+              <a:rPr lang="en-US" sz="1200" dirty="0" smtClean="0"/>
+              <a:t>Update mat files</a:t>
+            </a:r>
+          </a:p>
+          <a:p>
+            <a:pPr marL="628650" lvl="1" indent="-171450">
+              <a:buFontTx/>
+              <a:buChar char="-"/>
+            </a:pPr>
+            <a:r>
+              <a:rPr lang="en-US" sz="1200" dirty="0" err="1"/>
+              <a:t>matFN</a:t>
+            </a:r>
+            <a:r>
+              <a:rPr lang="en-US" sz="1200" dirty="0"/>
+              <a:t>\</a:t>
+            </a:r>
+            <a:r>
+              <a:rPr lang="en-US" sz="1200" dirty="0" err="1"/>
+              <a:t>nFrst</a:t>
+            </a:r>
+            <a:r>
+              <a:rPr lang="en-US" sz="1200" dirty="0"/>
+              <a:t> &amp;</a:t>
+            </a:r>
+            <a:r>
+              <a:rPr lang="en-US" sz="1200" dirty="0" err="1" smtClean="0"/>
+              <a:t>nLast</a:t>
+            </a:r>
+            <a:r>
+              <a:rPr lang="en-US" sz="1200" dirty="0"/>
+              <a:t> </a:t>
+            </a:r>
+            <a:r>
+              <a:rPr lang="en-US" sz="1200" dirty="0" smtClean="0"/>
+              <a:t>(current frame number)</a:t>
+            </a:r>
+            <a:endParaRPr lang="en-US" sz="1200" dirty="0"/>
+          </a:p>
+          <a:p>
+            <a:pPr marL="628650" lvl="1" indent="-171450">
+              <a:buFontTx/>
+              <a:buChar char="-"/>
+            </a:pPr>
+            <a:r>
+              <a:rPr lang="en-US" sz="1200" dirty="0" err="1"/>
+              <a:t>matFN</a:t>
+            </a:r>
+            <a:r>
+              <a:rPr lang="en-US" sz="1200" dirty="0"/>
+              <a:t>\</a:t>
+            </a:r>
+            <a:r>
+              <a:rPr lang="en-US" sz="1200" dirty="0" err="1"/>
+              <a:t>lmpState</a:t>
+            </a:r>
+            <a:r>
+              <a:rPr lang="en-US" sz="1200" dirty="0"/>
+              <a:t> (</a:t>
+            </a:r>
+            <a:r>
+              <a:rPr lang="en-US" sz="1200" dirty="0" smtClean="0"/>
+              <a:t>workers)</a:t>
+            </a:r>
+          </a:p>
+          <a:p>
+            <a:pPr marL="628650" lvl="1" indent="-171450">
+              <a:buFontTx/>
+              <a:buChar char="-"/>
+            </a:pPr>
+            <a:r>
+              <a:rPr lang="en-US" sz="1200" dirty="0" err="1" smtClean="0"/>
+              <a:t>btnMAT</a:t>
+            </a:r>
+            <a:r>
+              <a:rPr lang="en-US" sz="1200" dirty="0" smtClean="0"/>
+              <a:t>: button states (all) for snap/save &amp; timeout</a:t>
+            </a:r>
+          </a:p>
+          <a:p>
+            <a:pPr marL="1085850" lvl="2" indent="-171450">
+              <a:buFontTx/>
+              <a:buChar char="-"/>
+            </a:pPr>
+            <a:r>
+              <a:rPr lang="en-US" sz="1200" dirty="0" err="1"/>
+              <a:t>btnStart</a:t>
+            </a:r>
+            <a:endParaRPr lang="en-US" sz="1200" dirty="0"/>
+          </a:p>
+          <a:p>
+            <a:pPr marL="1085850" lvl="2" indent="-171450">
+              <a:buFontTx/>
+              <a:buChar char="-"/>
+            </a:pPr>
+            <a:r>
+              <a:rPr lang="en-US" sz="1200" dirty="0" err="1" smtClean="0"/>
+              <a:t>btnSync</a:t>
+            </a:r>
+            <a:endParaRPr lang="en-US" sz="1200" dirty="0" smtClean="0"/>
+          </a:p>
+          <a:p>
+            <a:pPr marL="1085850" lvl="2" indent="-171450">
+              <a:buFontTx/>
+              <a:buChar char="-"/>
+            </a:pPr>
+            <a:r>
+              <a:rPr lang="en-US" sz="1200" dirty="0" err="1" smtClean="0"/>
+              <a:t>btnSnap</a:t>
+            </a:r>
+            <a:r>
+              <a:rPr lang="en-US" sz="1200" dirty="0" smtClean="0"/>
+              <a:t>\</a:t>
+            </a:r>
+            <a:r>
+              <a:rPr lang="en-US" sz="1200" dirty="0"/>
+              <a:t> </a:t>
+            </a:r>
+            <a:r>
+              <a:rPr lang="en-US" sz="1200" dirty="0" err="1" smtClean="0"/>
+              <a:t>btnSave</a:t>
+            </a:r>
+            <a:endParaRPr lang="en-US" sz="1200" dirty="0" smtClean="0"/>
+          </a:p>
+          <a:p>
+            <a:pPr marL="1085850" lvl="2" indent="-171450">
+              <a:buFontTx/>
+              <a:buChar char="-"/>
+            </a:pPr>
+            <a:r>
+              <a:rPr lang="en-US" sz="1200" dirty="0" err="1"/>
+              <a:t>btnStop</a:t>
+            </a:r>
+            <a:endParaRPr lang="en-US" sz="1200" dirty="0"/>
+          </a:p>
+          <a:p>
+            <a:pPr marL="1085850" lvl="2" indent="-171450">
+              <a:buFontTx/>
+              <a:buChar char="-"/>
+            </a:pPr>
+            <a:endParaRPr lang="en-US" sz="1200" dirty="0"/>
+          </a:p>
+          <a:p>
+            <a:pPr marL="1085850" lvl="2" indent="-171450">
+              <a:buFontTx/>
+              <a:buChar char="-"/>
+            </a:pPr>
+            <a:endParaRPr lang="en-US" sz="1200" dirty="0"/>
+          </a:p>
+          <a:p>
+            <a:pPr marL="1085850" lvl="2" indent="-171450">
+              <a:buFontTx/>
+              <a:buChar char="-"/>
+            </a:pPr>
+            <a:endParaRPr lang="en-US" sz="1200" dirty="0" smtClean="0"/>
+          </a:p>
+        </p:txBody>
+      </p:sp>
+      <p:sp>
+        <p:nvSpPr>
+          <p:cNvPr id="40" name="Rectangle 39"/>
+          <p:cNvSpPr/>
+          <p:nvPr/>
+        </p:nvSpPr>
+        <p:spPr>
+          <a:xfrm>
+            <a:off x="7556707" y="4365010"/>
+            <a:ext cx="3780522" cy="2492990"/>
+          </a:xfrm>
+          <a:prstGeom prst="rect">
+            <a:avLst/>
+          </a:prstGeom>
+        </p:spPr>
+        <p:txBody>
+          <a:bodyPr wrap="none">
+            <a:spAutoFit/>
+          </a:bodyPr>
+          <a:lstStyle/>
+          <a:p>
+            <a:r>
+              <a:rPr lang="en-US" sz="1200" dirty="0" err="1" smtClean="0"/>
+              <a:t>rtTrackSNR.m</a:t>
+            </a:r>
+            <a:r>
+              <a:rPr lang="en-US" sz="1200" dirty="0" smtClean="0"/>
+              <a:t>\</a:t>
+            </a:r>
+            <a:r>
+              <a:rPr lang="en-US" sz="1200" dirty="0" err="1" smtClean="0"/>
+              <a:t>updateCommunication</a:t>
+            </a:r>
+            <a:r>
+              <a:rPr lang="en-US" sz="1200" dirty="0" smtClean="0"/>
+              <a:t> </a:t>
+            </a:r>
+          </a:p>
+          <a:p>
+            <a:pPr marL="171450" indent="-171450">
+              <a:buFontTx/>
+              <a:buChar char="-"/>
+            </a:pPr>
+            <a:r>
+              <a:rPr lang="en-US" sz="1200" dirty="0" smtClean="0"/>
+              <a:t>Wait </a:t>
+            </a:r>
+            <a:r>
+              <a:rPr lang="en-US" sz="1200" dirty="0" err="1" smtClean="0"/>
+              <a:t>btnStart</a:t>
+            </a:r>
+            <a:endParaRPr lang="en-US" sz="1200" dirty="0" smtClean="0"/>
+          </a:p>
+          <a:p>
+            <a:pPr marL="171450" indent="-171450">
+              <a:buFontTx/>
+              <a:buChar char="-"/>
+            </a:pPr>
+            <a:r>
+              <a:rPr lang="en-US" sz="1200" dirty="0" err="1" smtClean="0"/>
+              <a:t>checkStop</a:t>
+            </a:r>
+            <a:endParaRPr lang="en-US" sz="1200" dirty="0" smtClean="0"/>
+          </a:p>
+          <a:p>
+            <a:pPr marL="171450" indent="-171450">
+              <a:buFontTx/>
+              <a:buChar char="-"/>
+            </a:pPr>
+            <a:r>
+              <a:rPr lang="en-US" sz="1200" dirty="0" smtClean="0"/>
+              <a:t>Update </a:t>
+            </a:r>
+            <a:r>
+              <a:rPr lang="en-US" sz="1200" dirty="0" err="1" smtClean="0"/>
+              <a:t>uifigure</a:t>
+            </a:r>
+            <a:endParaRPr lang="en-US" sz="1200" dirty="0"/>
+          </a:p>
+          <a:p>
+            <a:pPr marL="628650" lvl="1" indent="-171450">
+              <a:buFontTx/>
+              <a:buChar char="-"/>
+            </a:pPr>
+            <a:r>
+              <a:rPr lang="en-US" sz="1200" dirty="0" err="1" smtClean="0"/>
+              <a:t>lmp</a:t>
+            </a:r>
+            <a:r>
+              <a:rPr lang="en-US" sz="1200" dirty="0" smtClean="0"/>
+              <a:t> lamp indicators (</a:t>
+            </a:r>
+            <a:r>
+              <a:rPr lang="en-US" sz="1200" dirty="0" smtClean="0">
+                <a:sym typeface="Wingdings" panose="05000000000000000000" pitchFamily="2" charset="2"/>
+              </a:rPr>
+              <a:t> </a:t>
+            </a:r>
+            <a:r>
+              <a:rPr lang="en-US" sz="1200" dirty="0" err="1" smtClean="0"/>
+              <a:t>matFN</a:t>
+            </a:r>
+            <a:r>
+              <a:rPr lang="en-US" sz="1200" dirty="0" smtClean="0"/>
+              <a:t>\</a:t>
+            </a:r>
+            <a:r>
+              <a:rPr lang="en-US" sz="1200" dirty="0" err="1" smtClean="0"/>
+              <a:t>lmpState</a:t>
+            </a:r>
+            <a:r>
+              <a:rPr lang="en-US" sz="1200" dirty="0" smtClean="0"/>
+              <a:t>)</a:t>
+            </a:r>
+            <a:endParaRPr lang="en-US" sz="1200" dirty="0"/>
+          </a:p>
+          <a:p>
+            <a:pPr marL="628650" lvl="1" indent="-171450">
+              <a:buFontTx/>
+              <a:buChar char="-"/>
+            </a:pPr>
+            <a:r>
+              <a:rPr lang="en-US" sz="1200" dirty="0"/>
+              <a:t>current frame number </a:t>
+            </a:r>
+            <a:r>
+              <a:rPr lang="en-US" sz="1200" dirty="0" smtClean="0"/>
+              <a:t>(</a:t>
+            </a:r>
+            <a:r>
+              <a:rPr lang="en-US" sz="1200" dirty="0" smtClean="0">
+                <a:sym typeface="Wingdings" panose="05000000000000000000" pitchFamily="2" charset="2"/>
+              </a:rPr>
+              <a:t> </a:t>
+            </a:r>
+            <a:r>
+              <a:rPr lang="en-US" sz="1200" dirty="0" err="1" smtClean="0"/>
+              <a:t>matFN</a:t>
+            </a:r>
+            <a:r>
+              <a:rPr lang="en-US" sz="1200" dirty="0" smtClean="0"/>
+              <a:t>\</a:t>
+            </a:r>
+            <a:r>
+              <a:rPr lang="en-US" sz="1200" dirty="0" err="1" smtClean="0"/>
+              <a:t>nFrst</a:t>
+            </a:r>
+            <a:r>
+              <a:rPr lang="en-US" sz="1200" dirty="0" smtClean="0"/>
+              <a:t> </a:t>
+            </a:r>
+            <a:r>
+              <a:rPr lang="en-US" sz="1200" dirty="0"/>
+              <a:t>&amp;</a:t>
+            </a:r>
+            <a:r>
+              <a:rPr lang="en-US" sz="1200" dirty="0" err="1"/>
+              <a:t>nLast</a:t>
+            </a:r>
+            <a:r>
+              <a:rPr lang="en-US" sz="1200" dirty="0" smtClean="0"/>
+              <a:t>)</a:t>
+            </a:r>
+          </a:p>
+          <a:p>
+            <a:pPr marL="628650" lvl="1" indent="-171450">
+              <a:buFontTx/>
+              <a:buChar char="-"/>
+            </a:pPr>
+            <a:r>
+              <a:rPr lang="en-US" sz="1200" dirty="0"/>
+              <a:t>Button </a:t>
+            </a:r>
+            <a:r>
+              <a:rPr lang="en-US" sz="1200" dirty="0" smtClean="0"/>
+              <a:t>colors (states) for all buttons</a:t>
+            </a:r>
+          </a:p>
+          <a:p>
+            <a:pPr marL="171450" indent="-171450">
+              <a:buFontTx/>
+              <a:buChar char="-"/>
+            </a:pPr>
+            <a:r>
+              <a:rPr lang="en-US" sz="1200" dirty="0" smtClean="0"/>
+              <a:t>Update mat files</a:t>
+            </a:r>
+          </a:p>
+          <a:p>
+            <a:pPr marL="628650" lvl="1" indent="-171450">
+              <a:buFontTx/>
+              <a:buChar char="-"/>
+            </a:pPr>
+            <a:r>
+              <a:rPr lang="en-US" sz="1200" dirty="0" err="1"/>
+              <a:t>btnMAT</a:t>
+            </a:r>
+            <a:endParaRPr lang="en-US" sz="1200" dirty="0"/>
+          </a:p>
+          <a:p>
+            <a:pPr marL="1085850" lvl="2" indent="-171450">
+              <a:buFontTx/>
+              <a:buChar char="-"/>
+            </a:pPr>
+            <a:r>
+              <a:rPr lang="en-US" sz="1200" dirty="0" smtClean="0"/>
+              <a:t>Start</a:t>
+            </a:r>
+          </a:p>
+          <a:p>
+            <a:pPr marL="1543050" lvl="3" indent="-171450">
+              <a:buFontTx/>
+              <a:buChar char="-"/>
+            </a:pPr>
+            <a:r>
+              <a:rPr lang="en-US" sz="1200" dirty="0" err="1" smtClean="0"/>
+              <a:t>btnStart</a:t>
+            </a:r>
+            <a:r>
+              <a:rPr lang="en-US" sz="1200" dirty="0" smtClean="0"/>
+              <a:t> = 1</a:t>
+            </a:r>
+            <a:endParaRPr lang="en-US" sz="1200" dirty="0"/>
+          </a:p>
+          <a:p>
+            <a:pPr marL="1543050" lvl="3" indent="-171450">
+              <a:buFontTx/>
+              <a:buChar char="-"/>
+            </a:pPr>
+            <a:r>
+              <a:rPr lang="en-US" sz="1200" dirty="0" err="1" smtClean="0"/>
+              <a:t>btnSync</a:t>
+            </a:r>
+            <a:r>
+              <a:rPr lang="en-US" sz="1200" dirty="0" smtClean="0"/>
+              <a:t> = 1</a:t>
+            </a:r>
+            <a:endParaRPr lang="en-US" sz="1200" dirty="0"/>
+          </a:p>
+          <a:p>
+            <a:pPr marL="1085850" lvl="2" indent="-171450">
+              <a:buFontTx/>
+              <a:buChar char="-"/>
+            </a:pPr>
+            <a:endParaRPr lang="en-US" sz="1200" dirty="0"/>
           </a:p>
         </p:txBody>
       </p:sp>

</xml_diff>